<commit_message>
Updated Presentation file to summarize certain slides.
</commit_message>
<xml_diff>
--- a/Presentation.pptx
+++ b/Presentation.pptx
@@ -8820,7 +8820,7 @@
         </p:nvSpPr>
         <p:spPr>
           <a:xfrm>
-            <a:off x="922000" y="891775"/>
+            <a:off x="838200" y="590550"/>
             <a:ext cx="2711700" cy="857400"/>
           </a:xfrm>
           <a:prstGeom prst="rect">
@@ -10420,8 +10420,8 @@
         </p:nvSpPr>
         <p:spPr>
           <a:xfrm>
-            <a:off x="762000" y="1885950"/>
-            <a:ext cx="2332200" cy="2963550"/>
+            <a:off x="685800" y="1352550"/>
+            <a:ext cx="2332200" cy="3200400"/>
           </a:xfrm>
           <a:prstGeom prst="rect">
             <a:avLst/>
@@ -10483,11 +10483,11 @@
                 <a:spcPts val="0"/>
               </a:spcAft>
               <a:buClr>
-                <a:srgbClr val="000000"/>
+                <a:schemeClr val="accent2"/>
               </a:buClr>
               <a:buSzTx/>
-              <a:buFont typeface="Arial"/>
-              <a:buNone/>
+              <a:buFont typeface="Arial" pitchFamily="34" charset="0"/>
+              <a:buChar char="•"/>
               <a:tabLst/>
               <a:defRPr/>
             </a:pPr>
@@ -10525,10 +10525,10 @@
                 <a:cs typeface="Arial"/>
                 <a:sym typeface="Arial"/>
               </a:rPr>
-              <a:t> Square Footage, Total Number of Rooms, House Grade, House Condition </a:t>
+              <a:t> Square </a:t>
             </a:r>
             <a:r>
-              <a:rPr kumimoji="0" lang="en-US" sz="1600" b="0" i="0" u="none" strike="noStrike" kern="0" cap="none" spc="0" normalizeH="0" noProof="0" dirty="0" err="1" smtClean="0">
+              <a:rPr kumimoji="0" lang="en-US" sz="1600" b="0" i="0" u="none" strike="noStrike" kern="0" cap="none" spc="0" normalizeH="0" noProof="0" dirty="0" smtClean="0">
                 <a:ln>
                   <a:noFill/>
                 </a:ln>
@@ -10543,11 +10543,222 @@
                 <a:cs typeface="Arial"/>
                 <a:sym typeface="Arial"/>
               </a:rPr>
-              <a:t>hav</a:t>
+              <a:t>Footage</a:t>
+            </a:r>
+          </a:p>
+          <a:p>
+            <a:pPr marL="0" marR="0" lvl="0" indent="0" algn="l" defTabSz="914400" rtl="0" eaLnBrk="1" fontAlgn="auto" latinLnBrk="0" hangingPunct="1">
+              <a:lnSpc>
+                <a:spcPct val="100000"/>
+              </a:lnSpc>
+              <a:spcBef>
+                <a:spcPts val="600"/>
+              </a:spcBef>
+              <a:spcAft>
+                <a:spcPts val="0"/>
+              </a:spcAft>
+              <a:buClr>
+                <a:schemeClr val="accent2"/>
+              </a:buClr>
+              <a:buSzTx/>
+              <a:buFont typeface="Arial" pitchFamily="34" charset="0"/>
+              <a:buChar char="•"/>
+              <a:tabLst/>
+              <a:defRPr/>
+            </a:pPr>
+            <a:r>
+              <a:rPr kumimoji="0" lang="en-US" sz="1600" b="0" i="0" u="none" strike="noStrike" kern="0" cap="none" spc="0" normalizeH="0" noProof="0" dirty="0" smtClean="0">
+                <a:ln>
+                  <a:noFill/>
+                </a:ln>
+                <a:solidFill>
+                  <a:srgbClr val="000000"/>
+                </a:solidFill>
+                <a:effectLst/>
+                <a:uLnTx/>
+                <a:uFillTx/>
+                <a:latin typeface="Arial"/>
+                <a:ea typeface="Arial"/>
+                <a:cs typeface="Arial"/>
+                <a:sym typeface="Arial"/>
+              </a:rPr>
+              <a:t>Total </a:t>
+            </a:r>
+            <a:r>
+              <a:rPr kumimoji="0" lang="en-US" sz="1600" b="0" i="0" u="none" strike="noStrike" kern="0" cap="none" spc="0" normalizeH="0" noProof="0" dirty="0" smtClean="0">
+                <a:ln>
+                  <a:noFill/>
+                </a:ln>
+                <a:solidFill>
+                  <a:srgbClr val="000000"/>
+                </a:solidFill>
+                <a:effectLst/>
+                <a:uLnTx/>
+                <a:uFillTx/>
+                <a:latin typeface="Arial"/>
+                <a:ea typeface="Arial"/>
+                <a:cs typeface="Arial"/>
+                <a:sym typeface="Arial"/>
+              </a:rPr>
+              <a:t>Number of </a:t>
+            </a:r>
+            <a:r>
+              <a:rPr kumimoji="0" lang="en-US" sz="1600" b="0" i="0" u="none" strike="noStrike" kern="0" cap="none" spc="0" normalizeH="0" noProof="0" dirty="0" smtClean="0">
+                <a:ln>
+                  <a:noFill/>
+                </a:ln>
+                <a:solidFill>
+                  <a:srgbClr val="000000"/>
+                </a:solidFill>
+                <a:effectLst/>
+                <a:uLnTx/>
+                <a:uFillTx/>
+                <a:latin typeface="Arial"/>
+                <a:ea typeface="Arial"/>
+                <a:cs typeface="Arial"/>
+                <a:sym typeface="Arial"/>
+              </a:rPr>
+              <a:t>Rooms</a:t>
+            </a:r>
+          </a:p>
+          <a:p>
+            <a:pPr marL="0" marR="0" lvl="0" indent="0" algn="l" defTabSz="914400" rtl="0" eaLnBrk="1" fontAlgn="auto" latinLnBrk="0" hangingPunct="1">
+              <a:lnSpc>
+                <a:spcPct val="100000"/>
+              </a:lnSpc>
+              <a:spcBef>
+                <a:spcPts val="600"/>
+              </a:spcBef>
+              <a:spcAft>
+                <a:spcPts val="0"/>
+              </a:spcAft>
+              <a:buClr>
+                <a:schemeClr val="accent2"/>
+              </a:buClr>
+              <a:buSzTx/>
+              <a:buFont typeface="Arial" pitchFamily="34" charset="0"/>
+              <a:buChar char="•"/>
+              <a:tabLst/>
+              <a:defRPr/>
+            </a:pPr>
+            <a:r>
+              <a:rPr kumimoji="0" lang="en-US" sz="1600" b="0" i="0" u="none" strike="noStrike" kern="0" cap="none" spc="0" normalizeH="0" noProof="0" dirty="0" smtClean="0">
+                <a:ln>
+                  <a:noFill/>
+                </a:ln>
+                <a:solidFill>
+                  <a:srgbClr val="000000"/>
+                </a:solidFill>
+                <a:effectLst/>
+                <a:uLnTx/>
+                <a:uFillTx/>
+                <a:latin typeface="Arial"/>
+                <a:ea typeface="Arial"/>
+                <a:cs typeface="Arial"/>
+                <a:sym typeface="Arial"/>
+              </a:rPr>
+              <a:t>House Grade</a:t>
+            </a:r>
+          </a:p>
+          <a:p>
+            <a:pPr marL="0" marR="0" lvl="0" indent="0" algn="l" defTabSz="914400" rtl="0" eaLnBrk="1" fontAlgn="auto" latinLnBrk="0" hangingPunct="1">
+              <a:lnSpc>
+                <a:spcPct val="100000"/>
+              </a:lnSpc>
+              <a:spcBef>
+                <a:spcPts val="600"/>
+              </a:spcBef>
+              <a:spcAft>
+                <a:spcPts val="0"/>
+              </a:spcAft>
+              <a:buClr>
+                <a:schemeClr val="accent2"/>
+              </a:buClr>
+              <a:buSzTx/>
+              <a:buFont typeface="Arial" pitchFamily="34" charset="0"/>
+              <a:buChar char="•"/>
+              <a:tabLst/>
+              <a:defRPr/>
+            </a:pPr>
+            <a:r>
+              <a:rPr kumimoji="0" lang="en-US" sz="1600" b="0" i="0" u="none" strike="noStrike" kern="0" cap="none" spc="0" normalizeH="0" noProof="0" dirty="0" smtClean="0">
+                <a:ln>
+                  <a:noFill/>
+                </a:ln>
+                <a:solidFill>
+                  <a:srgbClr val="000000"/>
+                </a:solidFill>
+                <a:effectLst/>
+                <a:uLnTx/>
+                <a:uFillTx/>
+                <a:latin typeface="Arial"/>
+                <a:ea typeface="Arial"/>
+                <a:cs typeface="Arial"/>
+                <a:sym typeface="Arial"/>
+              </a:rPr>
+              <a:t>House Condition</a:t>
+            </a:r>
+          </a:p>
+          <a:p>
+            <a:pPr marL="0" marR="0" lvl="0" indent="0" algn="l" defTabSz="914400" rtl="0" eaLnBrk="1" fontAlgn="auto" latinLnBrk="0" hangingPunct="1">
+              <a:lnSpc>
+                <a:spcPct val="100000"/>
+              </a:lnSpc>
+              <a:spcBef>
+                <a:spcPts val="600"/>
+              </a:spcBef>
+              <a:spcAft>
+                <a:spcPts val="0"/>
+              </a:spcAft>
+              <a:buClr>
+                <a:schemeClr val="accent2"/>
+              </a:buClr>
+              <a:buSzTx/>
+              <a:buFont typeface="Arial" pitchFamily="34" charset="0"/>
+              <a:buChar char="•"/>
+              <a:tabLst/>
+              <a:defRPr/>
+            </a:pPr>
+            <a:r>
+              <a:rPr lang="en-US" sz="1600" dirty="0" smtClean="0"/>
+              <a:t>Most </a:t>
             </a:r>
             <a:r>
               <a:rPr lang="en-US" sz="1600" dirty="0" smtClean="0"/>
-              <a:t>e most consistent data, provide increase in sale price in that order.</a:t>
+              <a:t>consistent </a:t>
+            </a:r>
+            <a:r>
+              <a:rPr lang="en-US" sz="1600" dirty="0" smtClean="0"/>
+              <a:t>data</a:t>
+            </a:r>
+          </a:p>
+          <a:p>
+            <a:pPr marL="0" marR="0" lvl="0" indent="0" algn="l" defTabSz="914400" rtl="0" eaLnBrk="1" fontAlgn="auto" latinLnBrk="0" hangingPunct="1">
+              <a:lnSpc>
+                <a:spcPct val="100000"/>
+              </a:lnSpc>
+              <a:spcBef>
+                <a:spcPts val="600"/>
+              </a:spcBef>
+              <a:spcAft>
+                <a:spcPts val="0"/>
+              </a:spcAft>
+              <a:buClr>
+                <a:schemeClr val="accent2"/>
+              </a:buClr>
+              <a:buSzTx/>
+              <a:buFont typeface="Arial" pitchFamily="34" charset="0"/>
+              <a:buChar char="•"/>
+              <a:tabLst/>
+              <a:defRPr/>
+            </a:pPr>
+            <a:r>
+              <a:rPr lang="en-US" sz="1600" dirty="0" smtClean="0"/>
+              <a:t> Provide </a:t>
+            </a:r>
+            <a:r>
+              <a:rPr lang="en-US" sz="1600" dirty="0" smtClean="0"/>
+              <a:t>increase in sale price in that order.</a:t>
             </a:r>
             <a:endParaRPr kumimoji="0" lang="en-US" sz="1600" b="0" i="0" u="none" strike="noStrike" kern="0" cap="none" spc="0" normalizeH="0" baseline="0" noProof="0" dirty="0">
               <a:ln>
@@ -10577,7 +10788,7 @@
         </p:nvSpPr>
         <p:spPr>
           <a:xfrm>
-            <a:off x="3200400" y="1885950"/>
+            <a:off x="3200400" y="1352550"/>
             <a:ext cx="2514600" cy="2963550"/>
           </a:xfrm>
           <a:prstGeom prst="rect">
@@ -10640,17 +10851,117 @@
                 <a:spcPts val="0"/>
               </a:spcAft>
               <a:buClr>
-                <a:srgbClr val="000000"/>
+                <a:schemeClr val="accent2"/>
               </a:buClr>
               <a:buSzTx/>
-              <a:buFont typeface="Arial"/>
-              <a:buNone/>
+              <a:buFont typeface="Arial" pitchFamily="34" charset="0"/>
+              <a:buChar char="•"/>
               <a:tabLst/>
               <a:defRPr/>
             </a:pPr>
             <a:r>
               <a:rPr lang="en-US" sz="1600" dirty="0" smtClean="0"/>
-              <a:t>House Renovation Year, Number of Floors, Sale Date either don’t provide enough data, or not enough change in sale price to warrant putting effort into.</a:t>
+              <a:t>House Renovation </a:t>
+            </a:r>
+            <a:r>
+              <a:rPr lang="en-US" sz="1600" dirty="0" smtClean="0"/>
+              <a:t>Year</a:t>
+            </a:r>
+          </a:p>
+          <a:p>
+            <a:pPr marL="0" marR="0" lvl="0" indent="0" algn="l" defTabSz="914400" rtl="0" eaLnBrk="1" fontAlgn="auto" latinLnBrk="0" hangingPunct="1">
+              <a:lnSpc>
+                <a:spcPct val="100000"/>
+              </a:lnSpc>
+              <a:spcBef>
+                <a:spcPts val="600"/>
+              </a:spcBef>
+              <a:spcAft>
+                <a:spcPts val="0"/>
+              </a:spcAft>
+              <a:buClr>
+                <a:schemeClr val="accent2"/>
+              </a:buClr>
+              <a:buSzTx/>
+              <a:buFont typeface="Arial" pitchFamily="34" charset="0"/>
+              <a:buChar char="•"/>
+              <a:tabLst/>
+              <a:defRPr/>
+            </a:pPr>
+            <a:r>
+              <a:rPr lang="en-US" sz="1600" dirty="0" smtClean="0"/>
+              <a:t>Number </a:t>
+            </a:r>
+            <a:r>
+              <a:rPr lang="en-US" sz="1600" dirty="0" smtClean="0"/>
+              <a:t>of </a:t>
+            </a:r>
+            <a:r>
+              <a:rPr lang="en-US" sz="1600" dirty="0" smtClean="0"/>
+              <a:t>Floors</a:t>
+            </a:r>
+          </a:p>
+          <a:p>
+            <a:pPr marL="0" marR="0" lvl="0" indent="0" algn="l" defTabSz="914400" rtl="0" eaLnBrk="1" fontAlgn="auto" latinLnBrk="0" hangingPunct="1">
+              <a:lnSpc>
+                <a:spcPct val="100000"/>
+              </a:lnSpc>
+              <a:spcBef>
+                <a:spcPts val="600"/>
+              </a:spcBef>
+              <a:spcAft>
+                <a:spcPts val="0"/>
+              </a:spcAft>
+              <a:buClr>
+                <a:schemeClr val="accent2"/>
+              </a:buClr>
+              <a:buSzTx/>
+              <a:buFont typeface="Arial" pitchFamily="34" charset="0"/>
+              <a:buChar char="•"/>
+              <a:tabLst/>
+              <a:defRPr/>
+            </a:pPr>
+            <a:r>
+              <a:rPr lang="en-US" sz="1600" dirty="0" smtClean="0"/>
+              <a:t>Sale </a:t>
+            </a:r>
+            <a:r>
+              <a:rPr lang="en-US" sz="1600" dirty="0" smtClean="0"/>
+              <a:t>Date </a:t>
+            </a:r>
+            <a:endParaRPr lang="en-US" sz="1600" dirty="0" smtClean="0"/>
+          </a:p>
+          <a:p>
+            <a:pPr marL="0" marR="0" lvl="0" indent="0" algn="l" defTabSz="914400" rtl="0" eaLnBrk="1" fontAlgn="auto" latinLnBrk="0" hangingPunct="1">
+              <a:lnSpc>
+                <a:spcPct val="100000"/>
+              </a:lnSpc>
+              <a:spcBef>
+                <a:spcPts val="600"/>
+              </a:spcBef>
+              <a:spcAft>
+                <a:spcPts val="0"/>
+              </a:spcAft>
+              <a:buClr>
+                <a:schemeClr val="accent2"/>
+              </a:buClr>
+              <a:buSzTx/>
+              <a:buFont typeface="Arial" pitchFamily="34" charset="0"/>
+              <a:buChar char="•"/>
+              <a:tabLst/>
+              <a:defRPr/>
+            </a:pPr>
+            <a:r>
+              <a:rPr lang="en-US" sz="1600" dirty="0" smtClean="0"/>
+              <a:t>Don’t provide </a:t>
+            </a:r>
+            <a:r>
+              <a:rPr lang="en-US" sz="1600" dirty="0" smtClean="0"/>
+              <a:t>enough data, or not enough change in </a:t>
+            </a:r>
+            <a:r>
+              <a:rPr lang="en-US" sz="1600" dirty="0" smtClean="0"/>
+              <a:t>sale price</a:t>
             </a:r>
             <a:endParaRPr kumimoji="0" lang="en-US" sz="1600" b="0" i="0" u="none" strike="noStrike" kern="0" cap="none" spc="0" normalizeH="0" baseline="0" noProof="0" dirty="0">
               <a:ln>
@@ -10680,8 +10991,8 @@
         </p:nvSpPr>
         <p:spPr>
           <a:xfrm>
-            <a:off x="5791200" y="1885950"/>
-            <a:ext cx="2408400" cy="2963550"/>
+            <a:off x="5791200" y="1352550"/>
+            <a:ext cx="2408400" cy="3276600"/>
           </a:xfrm>
           <a:prstGeom prst="rect">
             <a:avLst/>
@@ -10736,10 +11047,15 @@
               <a:spcBef>
                 <a:spcPts val="600"/>
               </a:spcBef>
+              <a:buClr>
+                <a:schemeClr val="accent2"/>
+              </a:buClr>
+              <a:buFont typeface="Arial" pitchFamily="34" charset="0"/>
+              <a:buChar char="•"/>
             </a:pPr>
             <a:r>
               <a:rPr lang="en-US" sz="1200" dirty="0" smtClean="0"/>
-              <a:t>While Square </a:t>
+              <a:t>Square </a:t>
             </a:r>
             <a:r>
               <a:rPr lang="en-US" sz="1200" dirty="0" smtClean="0"/>
@@ -10747,7 +11063,39 @@
             </a:r>
             <a:r>
               <a:rPr lang="en-US" sz="1200" dirty="0" smtClean="0"/>
-              <a:t>Lot, Waterfront View, Number </a:t>
+              <a:t>Lot</a:t>
+            </a:r>
+          </a:p>
+          <a:p>
+            <a:pPr lvl="0">
+              <a:spcBef>
+                <a:spcPts val="600"/>
+              </a:spcBef>
+              <a:buClr>
+                <a:schemeClr val="accent2"/>
+              </a:buClr>
+              <a:buFont typeface="Arial" pitchFamily="34" charset="0"/>
+              <a:buChar char="•"/>
+            </a:pPr>
+            <a:r>
+              <a:rPr lang="en-US" sz="1200" dirty="0" smtClean="0"/>
+              <a:t>Waterfront View</a:t>
+            </a:r>
+          </a:p>
+          <a:p>
+            <a:pPr lvl="0">
+              <a:spcBef>
+                <a:spcPts val="600"/>
+              </a:spcBef>
+              <a:buClr>
+                <a:schemeClr val="accent2"/>
+              </a:buClr>
+              <a:buFont typeface="Arial" pitchFamily="34" charset="0"/>
+              <a:buChar char="•"/>
+            </a:pPr>
+            <a:r>
+              <a:rPr lang="en-US" sz="1200" dirty="0" smtClean="0"/>
+              <a:t>Number </a:t>
             </a:r>
             <a:r>
               <a:rPr lang="en-US" sz="1200" dirty="0" smtClean="0"/>
@@ -10755,7 +11103,23 @@
             </a:r>
             <a:r>
               <a:rPr lang="en-US" sz="1200" dirty="0" smtClean="0"/>
-              <a:t>House, House </a:t>
+              <a:t>House</a:t>
+            </a:r>
+          </a:p>
+          <a:p>
+            <a:pPr lvl="0">
+              <a:spcBef>
+                <a:spcPts val="600"/>
+              </a:spcBef>
+              <a:buClr>
+                <a:schemeClr val="accent2"/>
+              </a:buClr>
+              <a:buFont typeface="Arial" pitchFamily="34" charset="0"/>
+              <a:buChar char="•"/>
+            </a:pPr>
+            <a:r>
+              <a:rPr lang="en-US" sz="1200" dirty="0" smtClean="0"/>
+              <a:t>House </a:t>
             </a:r>
             <a:r>
               <a:rPr lang="en-US" sz="1200" dirty="0" smtClean="0"/>
@@ -10763,7 +11127,23 @@
             </a:r>
             <a:r>
               <a:rPr lang="en-US" sz="1200" dirty="0" smtClean="0"/>
-              <a:t>Year, Location </a:t>
+              <a:t>Year</a:t>
+            </a:r>
+          </a:p>
+          <a:p>
+            <a:pPr lvl="0">
+              <a:spcBef>
+                <a:spcPts val="600"/>
+              </a:spcBef>
+              <a:buClr>
+                <a:schemeClr val="accent2"/>
+              </a:buClr>
+              <a:buFont typeface="Arial" pitchFamily="34" charset="0"/>
+              <a:buChar char="•"/>
+            </a:pPr>
+            <a:r>
+              <a:rPr lang="en-US" sz="1200" dirty="0" smtClean="0"/>
+              <a:t>Location </a:t>
             </a:r>
             <a:r>
               <a:rPr lang="en-US" sz="1200" dirty="0" smtClean="0"/>
@@ -10775,20 +11155,50 @@
             </a:r>
             <a:r>
               <a:rPr lang="en-US" sz="1200" dirty="0" smtClean="0"/>
-              <a:t>, Latitude and Longitude</a:t>
+              <a:t>, Latitude and </a:t>
             </a:r>
             <a:r>
               <a:rPr lang="en-US" sz="1200" dirty="0" smtClean="0"/>
-              <a:t>), Square </a:t>
+              <a:t>Longitude)</a:t>
+            </a:r>
+          </a:p>
+          <a:p>
+            <a:pPr lvl="0">
+              <a:spcBef>
+                <a:spcPts val="600"/>
+              </a:spcBef>
+              <a:buClr>
+                <a:schemeClr val="accent2"/>
+              </a:buClr>
+              <a:buFont typeface="Arial" pitchFamily="34" charset="0"/>
+              <a:buChar char="•"/>
+            </a:pPr>
+            <a:r>
+              <a:rPr lang="en-US" sz="1200" dirty="0" smtClean="0"/>
+              <a:t>Square </a:t>
             </a:r>
             <a:r>
               <a:rPr lang="en-US" sz="1200" dirty="0" smtClean="0"/>
-              <a:t>Footage of the Living Area and Lot of the nearest 15 </a:t>
+              <a:t>Footage of the Living Area and Lot of the nearest 15 Neighbors </a:t>
             </a:r>
+            <a:endParaRPr lang="en-US" sz="1200" dirty="0" smtClean="0"/>
+          </a:p>
+          <a:p>
+            <a:pPr lvl="0">
+              <a:spcBef>
+                <a:spcPts val="600"/>
+              </a:spcBef>
+              <a:buClr>
+                <a:schemeClr val="accent2"/>
+              </a:buClr>
+              <a:buFont typeface="Arial" pitchFamily="34" charset="0"/>
+              <a:buChar char="•"/>
+            </a:pPr>
             <a:r>
               <a:rPr lang="en-US" sz="1200" dirty="0" smtClean="0"/>
-              <a:t>Neighbors all certainly have a marked increase in home sale price, they are not things that can be changed during a home renovation.</a:t>
+              <a:t>Cannot be changed via renovation, despite showing increase in sale price.</a:t>
             </a:r>
+            <a:endParaRPr lang="en-US" sz="1200" dirty="0" smtClean="0"/>
           </a:p>
         </p:txBody>
       </p:sp>
@@ -10836,7 +11246,7 @@
         </p:nvSpPr>
         <p:spPr>
           <a:xfrm>
-            <a:off x="922000" y="1272775"/>
+            <a:off x="914400" y="590550"/>
             <a:ext cx="6866100" cy="857400"/>
           </a:xfrm>
           <a:prstGeom prst="rect">
@@ -10878,8 +11288,8 @@
         </p:nvSpPr>
         <p:spPr>
           <a:xfrm>
-            <a:off x="922000" y="2266951"/>
-            <a:ext cx="6866100" cy="2366100"/>
+            <a:off x="838200" y="1428750"/>
+            <a:ext cx="7467600" cy="3276600"/>
           </a:xfrm>
           <a:prstGeom prst="rect">
             <a:avLst/>
@@ -10891,19 +11301,75 @@
           </a:bodyPr>
           <a:lstStyle/>
           <a:p>
-            <a:pPr marL="0" lvl="0" indent="0" algn="l" rtl="0">
-              <a:spcBef>
-                <a:spcPts val="600"/>
-              </a:spcBef>
-              <a:spcAft>
-                <a:spcPts val="0"/>
-              </a:spcAft>
-              <a:buNone/>
-            </a:pPr>
+            <a:pPr marL="0" indent="0"/>
             <a:r>
               <a:rPr lang="en-US" sz="2400" dirty="0" smtClean="0"/>
-              <a:t>Further investigate chosen house features to ensure they aren’t too correlated with each other. Obtain data on other house features that can be changed during a renovation (having a pool, having a garage) to see what effect they might have on the overall sale price.</a:t>
+              <a:t>Further investigate chosen house </a:t>
             </a:r>
+            <a:r>
+              <a:rPr lang="en-US" sz="2400" dirty="0" smtClean="0"/>
+              <a:t>features</a:t>
+            </a:r>
+          </a:p>
+          <a:p>
+            <a:pPr marL="0" indent="0"/>
+            <a:r>
+              <a:rPr lang="en-US" sz="2400" dirty="0" smtClean="0"/>
+              <a:t>Look for links between features to ensure they aren’t affecting each other</a:t>
+            </a:r>
+          </a:p>
+          <a:p>
+            <a:pPr marL="0" indent="0"/>
+            <a:r>
+              <a:rPr lang="en-US" sz="2400" dirty="0" smtClean="0"/>
+              <a:t>Obtain </a:t>
+            </a:r>
+            <a:r>
+              <a:rPr lang="en-US" sz="2400" dirty="0" smtClean="0"/>
+              <a:t>data on other house </a:t>
+            </a:r>
+            <a:r>
+              <a:rPr lang="en-US" sz="2400" dirty="0" smtClean="0"/>
+              <a:t>renovation options:</a:t>
+            </a:r>
+          </a:p>
+          <a:p>
+            <a:pPr marL="457200" lvl="1" indent="0"/>
+            <a:r>
+              <a:rPr lang="en-US" sz="2400" dirty="0" smtClean="0"/>
+              <a:t>Adding a Pool</a:t>
+            </a:r>
+          </a:p>
+          <a:p>
+            <a:pPr marL="457200" lvl="1" indent="0"/>
+            <a:r>
+              <a:rPr lang="en-US" sz="2400" dirty="0" smtClean="0"/>
+              <a:t>Adding a Garage or increasing its size</a:t>
+            </a:r>
+          </a:p>
+          <a:p>
+            <a:pPr marL="0" indent="0"/>
+            <a:r>
+              <a:rPr lang="en-US" sz="2400" dirty="0" smtClean="0"/>
+              <a:t>Check what </a:t>
+            </a:r>
+            <a:r>
+              <a:rPr lang="en-US" sz="2400" dirty="0" smtClean="0"/>
+              <a:t>effect they </a:t>
+            </a:r>
+            <a:r>
+              <a:rPr lang="en-US" sz="2400" dirty="0" smtClean="0"/>
+              <a:t>have </a:t>
+            </a:r>
+            <a:r>
+              <a:rPr lang="en-US" sz="2400" dirty="0" smtClean="0"/>
+              <a:t>on the </a:t>
+            </a:r>
+            <a:r>
+              <a:rPr lang="en-US" sz="2400" dirty="0" smtClean="0"/>
+              <a:t>sale price</a:t>
+            </a:r>
+            <a:endParaRPr lang="en-US" sz="2400" dirty="0" smtClean="0"/>
           </a:p>
         </p:txBody>
       </p:sp>
@@ -12264,10 +12730,18 @@
               </a:spcAft>
               <a:buNone/>
             </a:pPr>
-            <a:r>
-              <a:rPr lang="en" sz="3600" b="1" dirty="0"/>
-              <a:t>I am </a:t>
-            </a:r>
+            <a:endParaRPr lang="en" sz="3600" b="1" dirty="0" smtClean="0"/>
+          </a:p>
+          <a:p>
+            <a:pPr marL="0" lvl="0" indent="0" algn="l" rtl="0">
+              <a:spcBef>
+                <a:spcPts val="600"/>
+              </a:spcBef>
+              <a:spcAft>
+                <a:spcPts val="0"/>
+              </a:spcAft>
+              <a:buNone/>
+            </a:pPr>
             <a:r>
               <a:rPr lang="en" sz="3600" b="1" dirty="0" smtClean="0"/>
               <a:t>Andrew </a:t>
@@ -12294,57 +12768,18 @@
               <a:buNone/>
             </a:pPr>
             <a:r>
-              <a:rPr lang="en" dirty="0"/>
-              <a:t>I am here </a:t>
+              <a:rPr lang="en-US" dirty="0" smtClean="0"/>
+              <a:t>North </a:t>
             </a:r>
             <a:r>
               <a:rPr lang="en-US" dirty="0" smtClean="0"/>
-              <a:t>on behalf of North Star Consulting to</a:t>
-            </a:r>
-          </a:p>
-          <a:p>
-            <a:pPr marL="0" lvl="0" indent="0" algn="l" rtl="0">
-              <a:spcBef>
-                <a:spcPts val="600"/>
-              </a:spcBef>
-              <a:spcAft>
-                <a:spcPts val="0"/>
-              </a:spcAft>
-              <a:buClr>
-                <a:schemeClr val="dk1"/>
-              </a:buClr>
-              <a:buSzPts val="1100"/>
-              <a:buFont typeface="Arial"/>
-              <a:buNone/>
-            </a:pPr>
-            <a:r>
-              <a:rPr lang="en-US" dirty="0" smtClean="0"/>
-              <a:t>p</a:t>
+              <a:t>Star </a:t>
             </a:r>
             <a:r>
               <a:rPr lang="en-US" dirty="0" smtClean="0"/>
-              <a:t>resent information related to housing in </a:t>
+              <a:t>Consulting</a:t>
             </a:r>
-          </a:p>
-          <a:p>
-            <a:pPr marL="0" lvl="0" indent="0" algn="l" rtl="0">
-              <a:spcBef>
-                <a:spcPts val="600"/>
-              </a:spcBef>
-              <a:spcAft>
-                <a:spcPts val="0"/>
-              </a:spcAft>
-              <a:buClr>
-                <a:schemeClr val="dk1"/>
-              </a:buClr>
-              <a:buSzPts val="1100"/>
-              <a:buFont typeface="Arial"/>
-              <a:buNone/>
-            </a:pPr>
-            <a:r>
-              <a:rPr lang="en-US" dirty="0" smtClean="0"/>
-              <a:t>King County, WA.</a:t>
-            </a:r>
+            <a:endParaRPr lang="en-US" dirty="0" smtClean="0"/>
           </a:p>
         </p:txBody>
       </p:sp>
@@ -19054,26 +19489,21 @@
             </a:br>
             <a:r>
               <a:rPr lang="en-US" sz="1600" b="1" dirty="0" smtClean="0"/>
-              <a:t>Squar</a:t>
-            </a:r>
-            <a:r>
-              <a:rPr lang="en-US" sz="1600" b="1" dirty="0" smtClean="0"/>
-              <a:t>e Footage</a:t>
+              <a:t>Square Footage</a:t>
             </a:r>
           </a:p>
           <a:p>
-            <a:pPr marL="0" lvl="0" indent="0" algn="l" rtl="0">
-              <a:spcBef>
-                <a:spcPts val="600"/>
-              </a:spcBef>
-              <a:spcAft>
-                <a:spcPts val="0"/>
-              </a:spcAft>
-              <a:buNone/>
-            </a:pPr>
+            <a:pPr marL="0" indent="0"/>
             <a:r>
               <a:rPr lang="en-US" sz="1600" dirty="0" smtClean="0"/>
-              <a:t>The square footage throughout the entire house, including a basement if there is one.</a:t>
+              <a:t>Square Footage of   Entire House</a:t>
+            </a:r>
+          </a:p>
+          <a:p>
+            <a:pPr marL="0" indent="0"/>
+            <a:r>
+              <a:rPr lang="en-US" sz="1600" dirty="0" smtClean="0"/>
+              <a:t>Includes Basement</a:t>
             </a:r>
             <a:endParaRPr sz="1600"/>
           </a:p>
@@ -19091,7 +19521,7 @@
         </p:nvSpPr>
         <p:spPr>
           <a:xfrm>
-            <a:off x="3373776" y="1885950"/>
+            <a:off x="3276600" y="1885950"/>
             <a:ext cx="2332200" cy="2963550"/>
           </a:xfrm>
           <a:prstGeom prst="rect">
@@ -19120,18 +19550,56 @@
             <a:endParaRPr b="1"/>
           </a:p>
           <a:p>
-            <a:pPr marL="0" lvl="0" indent="0" algn="l" rtl="0">
-              <a:spcBef>
-                <a:spcPts val="600"/>
-              </a:spcBef>
-              <a:spcAft>
-                <a:spcPts val="0"/>
-              </a:spcAft>
-              <a:buNone/>
-            </a:pPr>
+            <a:pPr marL="0" indent="0"/>
             <a:r>
               <a:rPr lang="en" dirty="0" smtClean="0"/>
-              <a:t>Scale of 1 (being Poor) to 5 (being Very Good) of how well maintained the house is, in terms of deterioration and repairs.</a:t>
+              <a:t>Scale of 1 </a:t>
+            </a:r>
+            <a:r>
+              <a:rPr lang="en" dirty="0" smtClean="0"/>
+              <a:t>to </a:t>
+            </a:r>
+            <a:r>
+              <a:rPr lang="en" dirty="0" smtClean="0"/>
+              <a:t>5 </a:t>
+            </a:r>
+            <a:endParaRPr lang="en" dirty="0" smtClean="0"/>
+          </a:p>
+          <a:p>
+            <a:pPr marL="0" indent="0"/>
+            <a:r>
+              <a:rPr lang="en" dirty="0" smtClean="0"/>
+              <a:t>Poor to </a:t>
+            </a:r>
+            <a:r>
+              <a:rPr lang="en" dirty="0" smtClean="0"/>
+              <a:t>Very </a:t>
+            </a:r>
+            <a:r>
+              <a:rPr lang="en" dirty="0" smtClean="0"/>
+              <a:t>Good </a:t>
+            </a:r>
+          </a:p>
+          <a:p>
+            <a:pPr marL="0" indent="0"/>
+            <a:r>
+              <a:rPr lang="en" dirty="0" smtClean="0"/>
+              <a:t>Home Maintainance</a:t>
+            </a:r>
+          </a:p>
+          <a:p>
+            <a:pPr marL="0" indent="0"/>
+            <a:r>
+              <a:rPr lang="en" dirty="0" smtClean="0"/>
+              <a:t>Home Deterioration </a:t>
+            </a:r>
+            <a:r>
+              <a:rPr lang="en" dirty="0" smtClean="0"/>
+              <a:t>and </a:t>
+            </a:r>
+            <a:r>
+              <a:rPr lang="en" dirty="0" smtClean="0"/>
+              <a:t> Repairs</a:t>
             </a:r>
             <a:endParaRPr/>
           </a:p>
@@ -19149,8 +19617,8 @@
         </p:nvSpPr>
         <p:spPr>
           <a:xfrm>
-            <a:off x="5825552" y="1885950"/>
-            <a:ext cx="2332200" cy="2963550"/>
+            <a:off x="5715000" y="1885950"/>
+            <a:ext cx="3013648" cy="2963550"/>
           </a:xfrm>
           <a:prstGeom prst="rect">
             <a:avLst/>
@@ -19178,18 +19646,69 @@
             <a:endParaRPr b="1"/>
           </a:p>
           <a:p>
-            <a:pPr marL="0" lvl="0" indent="0" algn="l" rtl="0">
-              <a:spcBef>
-                <a:spcPts val="600"/>
-              </a:spcBef>
-              <a:spcAft>
-                <a:spcPts val="0"/>
-              </a:spcAft>
-              <a:buNone/>
-            </a:pPr>
+            <a:pPr marL="0" indent="0"/>
             <a:r>
               <a:rPr lang="en-US" dirty="0" smtClean="0"/>
-              <a:t>Scale of 1 to 13 of the building standards of the home. This includes things such as meeting building codes, as well as the quality of the materials, construction, fixtures, and overall design of the home.</a:t>
+              <a:t>Scale of 1 to 13 </a:t>
+            </a:r>
+            <a:endParaRPr lang="en-US" dirty="0" smtClean="0"/>
+          </a:p>
+          <a:p>
+            <a:pPr marL="0" indent="0"/>
+            <a:r>
+              <a:rPr lang="en-US" dirty="0" smtClean="0"/>
+              <a:t>Building Standards</a:t>
+            </a:r>
+          </a:p>
+          <a:p>
+            <a:pPr marL="0" indent="0"/>
+            <a:r>
+              <a:rPr lang="en-US" dirty="0" smtClean="0"/>
+              <a:t>Includes:</a:t>
+            </a:r>
+          </a:p>
+          <a:p>
+            <a:pPr marL="457200" lvl="1" indent="0"/>
+            <a:r>
+              <a:rPr lang="en-US" dirty="0" smtClean="0"/>
+              <a:t>Meeting Building Codes</a:t>
+            </a:r>
+          </a:p>
+          <a:p>
+            <a:pPr marL="457200" lvl="1" indent="0"/>
+            <a:r>
+              <a:rPr lang="en-US" dirty="0" smtClean="0"/>
+              <a:t>Q</a:t>
+            </a:r>
+            <a:r>
+              <a:rPr lang="en-US" dirty="0" smtClean="0"/>
+              <a:t>uality of Materials</a:t>
+            </a:r>
+          </a:p>
+          <a:p>
+            <a:pPr marL="457200" lvl="1" indent="0"/>
+            <a:r>
+              <a:rPr lang="en-US" dirty="0" smtClean="0"/>
+              <a:t>Quality of </a:t>
+            </a:r>
+            <a:r>
+              <a:rPr lang="en-US" dirty="0" smtClean="0"/>
+              <a:t>Construction</a:t>
+            </a:r>
+            <a:endParaRPr lang="en-US" dirty="0" smtClean="0"/>
+          </a:p>
+          <a:p>
+            <a:pPr marL="457200" lvl="1" indent="0"/>
+            <a:r>
+              <a:rPr lang="en-US" dirty="0" smtClean="0"/>
+              <a:t>Bathroom/Kitchen Fixtures</a:t>
+            </a:r>
+          </a:p>
+          <a:p>
+            <a:pPr marL="457200" lvl="1" indent="0"/>
+            <a:r>
+              <a:rPr lang="en-US" dirty="0" smtClean="0"/>
+              <a:t>Overall Home Design</a:t>
             </a:r>
             <a:endParaRPr/>
           </a:p>

</xml_diff>